<commit_message>
real-time processing with predictions
</commit_message>
<xml_diff>
--- a/references/Презентация проекта.pptx
+++ b/references/Презентация проекта.pptx
@@ -650,7 +650,7 @@
             </a:pPr>
             <a:fld id="{1D8BD707-D9CF-40AE-B4C6-C98DA3205C09}" type="datetimeFigureOut">
               <a:rPr lang="en-US"/>
-              <a:t>5/11/23</a:t>
+              <a:t>5/28/23</a:t>
             </a:fld>
             <a:endParaRPr lang="en-US"/>
           </a:p>
@@ -1165,7 +1165,7 @@
           <a:p>
             <a:fld id="{4583FB6F-ACA5-4987-9D7D-422181772236}" type="datetimeFigureOut">
               <a:rPr lang="ru-RU" smtClean="0"/>
-              <a:t>11.05.2023</a:t>
+              <a:t>28.05.2023</a:t>
             </a:fld>
             <a:endParaRPr lang="ru-RU"/>
           </a:p>
@@ -2271,7 +2271,7 @@
           <a:p>
             <a:fld id="{4583FB6F-ACA5-4987-9D7D-422181772236}" type="datetimeFigureOut">
               <a:rPr lang="ru-RU" smtClean="0"/>
-              <a:t>11.05.2023</a:t>
+              <a:t>28.05.2023</a:t>
             </a:fld>
             <a:endParaRPr lang="ru-RU"/>
           </a:p>
@@ -2489,7 +2489,7 @@
             </a:pPr>
             <a:fld id="{1D8BD707-D9CF-40AE-B4C6-C98DA3205C09}" type="datetimeFigureOut">
               <a:rPr lang="en-US"/>
-              <a:t>5/11/23</a:t>
+              <a:t>5/28/23</a:t>
             </a:fld>
             <a:endParaRPr lang="en-US"/>
           </a:p>
@@ -2716,7 +2716,7 @@
           <a:p>
             <a:fld id="{4583FB6F-ACA5-4987-9D7D-422181772236}" type="datetimeFigureOut">
               <a:rPr lang="ru-RU" smtClean="0"/>
-              <a:t>11.05.2023</a:t>
+              <a:t>28.05.2023</a:t>
             </a:fld>
             <a:endParaRPr lang="ru-RU"/>
           </a:p>
@@ -3130,8 +3130,8 @@
         </p:nvSpPr>
         <p:spPr bwMode="auto">
           <a:xfrm>
-            <a:off x="1958010" y="2575046"/>
-            <a:ext cx="8179905" cy="1905000"/>
+            <a:off x="834888" y="2166729"/>
+            <a:ext cx="10793228" cy="2534479"/>
           </a:xfrm>
           <a:prstGeom prst="rect">
             <a:avLst/>
@@ -3159,7 +3159,35 @@
                 </a:solidFill>
                 <a:latin typeface="SB Sans Display Semibold"/>
               </a:rPr>
-              <a:t>Определение дистанции до объекта на видео</a:t>
+              <a:t>Применение детектора </a:t>
+            </a:r>
+          </a:p>
+          <a:p>
+            <a:pPr lvl="0" algn="ctr">
+              <a:defRPr/>
+            </a:pPr>
+            <a:r>
+              <a:rPr lang="ru-RU" sz="5400" b="1" dirty="0">
+                <a:solidFill>
+                  <a:srgbClr val="333F48"/>
+                </a:solidFill>
+                <a:latin typeface="SB Sans Display Semibold"/>
+              </a:rPr>
+              <a:t>для определения дистанции </a:t>
+            </a:r>
+          </a:p>
+          <a:p>
+            <a:pPr lvl="0" algn="ctr">
+              <a:defRPr/>
+            </a:pPr>
+            <a:r>
+              <a:rPr lang="ru-RU" sz="5400" b="1" dirty="0">
+                <a:solidFill>
+                  <a:srgbClr val="333F48"/>
+                </a:solidFill>
+                <a:latin typeface="SB Sans Display Semibold"/>
+              </a:rPr>
+              <a:t>до объекта на видео</a:t>
             </a:r>
             <a:endParaRPr dirty="0"/>
           </a:p>
@@ -3406,43 +3434,150 @@
                 <a:latin typeface="SB Sans Text Light" panose="020B0303040504020204" pitchFamily="34" charset="0"/>
                 <a:cs typeface="SB Sans Text Light" panose="020B0303040504020204" pitchFamily="34" charset="0"/>
               </a:rPr>
+              <a:t>, java-</a:t>
+            </a:r>
+            <a:r>
+              <a:rPr lang="ru-RU" sz="1400" dirty="0">
+                <a:latin typeface="SB Sans Text Light" panose="020B0303040504020204" pitchFamily="34" charset="0"/>
+                <a:cs typeface="SB Sans Text Light" panose="020B0303040504020204" pitchFamily="34" charset="0"/>
+              </a:rPr>
+              <a:t>разработчик/руководитель направления</a:t>
+            </a:r>
+            <a:r>
+              <a:rPr lang="en-US" sz="1400" dirty="0">
+                <a:latin typeface="SB Sans Text Light" panose="020B0303040504020204" pitchFamily="34" charset="0"/>
+                <a:cs typeface="SB Sans Text Light" panose="020B0303040504020204" pitchFamily="34" charset="0"/>
+              </a:rPr>
+              <a:t>.</a:t>
+            </a:r>
+            <a:br>
+              <a:rPr lang="ru-RU" sz="1400" dirty="0">
+                <a:latin typeface="SB Sans Text Light" panose="020B0303040504020204" pitchFamily="34" charset="0"/>
+                <a:cs typeface="SB Sans Text Light" panose="020B0303040504020204" pitchFamily="34" charset="0"/>
+              </a:rPr>
+            </a:br>
+            <a:r>
+              <a:rPr lang="ru-RU" sz="1400" dirty="0">
+                <a:latin typeface="SB Sans Text Light" panose="020B0303040504020204" pitchFamily="34" charset="0"/>
+                <a:cs typeface="SB Sans Text Light" panose="020B0303040504020204" pitchFamily="34" charset="0"/>
+              </a:rPr>
+              <a:t>В команде занимаюсь развитием крупного проекта «Единый профиль клиента» в части работы с данными. Активно работаем с СУБД</a:t>
+            </a:r>
+            <a:r>
+              <a:rPr lang="en-US" sz="1400" dirty="0">
+                <a:latin typeface="SB Sans Text Light" panose="020B0303040504020204" pitchFamily="34" charset="0"/>
+                <a:cs typeface="SB Sans Text Light" panose="020B0303040504020204" pitchFamily="34" charset="0"/>
+              </a:rPr>
+              <a:t> (Oracle/Postgres)</a:t>
+            </a:r>
+            <a:r>
+              <a:rPr lang="ru-RU" sz="1400" dirty="0">
+                <a:latin typeface="SB Sans Text Light" panose="020B0303040504020204" pitchFamily="34" charset="0"/>
+                <a:cs typeface="SB Sans Text Light" panose="020B0303040504020204" pitchFamily="34" charset="0"/>
+              </a:rPr>
               <a:t>, </a:t>
             </a:r>
             <a:r>
-              <a:rPr lang="ru-RU" sz="1400" dirty="0">
-                <a:latin typeface="SB Sans Text Light" panose="020B0303040504020204" pitchFamily="34" charset="0"/>
-                <a:cs typeface="SB Sans Text Light" panose="020B0303040504020204" pitchFamily="34" charset="0"/>
-              </a:rPr>
-              <a:t>руководитель направления, архитектура</a:t>
-            </a:r>
-            <a:r>
               <a:rPr lang="en-US" sz="1400" dirty="0">
                 <a:latin typeface="SB Sans Text Light" panose="020B0303040504020204" pitchFamily="34" charset="0"/>
                 <a:cs typeface="SB Sans Text Light" panose="020B0303040504020204" pitchFamily="34" charset="0"/>
               </a:rPr>
+              <a:t>Ignite, Kafka, Zookeeper. </a:t>
+            </a:r>
+            <a:r>
+              <a:rPr lang="ru-RU" sz="1400" dirty="0">
+                <a:latin typeface="SB Sans Text Light" panose="020B0303040504020204" pitchFamily="34" charset="0"/>
+                <a:cs typeface="SB Sans Text Light" panose="020B0303040504020204" pitchFamily="34" charset="0"/>
+              </a:rPr>
+              <a:t>Распиливаем монолит на </a:t>
+            </a:r>
+            <a:r>
+              <a:rPr lang="ru-RU" sz="1400" dirty="0" err="1">
+                <a:latin typeface="SB Sans Text Light" panose="020B0303040504020204" pitchFamily="34" charset="0"/>
+                <a:cs typeface="SB Sans Text Light" panose="020B0303040504020204" pitchFamily="34" charset="0"/>
+              </a:rPr>
+              <a:t>микросервисы</a:t>
+            </a:r>
+            <a:r>
+              <a:rPr lang="ru-RU" sz="1400" dirty="0">
+                <a:latin typeface="SB Sans Text Light" panose="020B0303040504020204" pitchFamily="34" charset="0"/>
+                <a:cs typeface="SB Sans Text Light" panose="020B0303040504020204" pitchFamily="34" charset="0"/>
+              </a:rPr>
+              <a:t> в </a:t>
+            </a:r>
+            <a:r>
+              <a:rPr lang="en-US" sz="1400" dirty="0">
+                <a:latin typeface="SB Sans Text Light" panose="020B0303040504020204" pitchFamily="34" charset="0"/>
+                <a:cs typeface="SB Sans Text Light" panose="020B0303040504020204" pitchFamily="34" charset="0"/>
+              </a:rPr>
+              <a:t>OpenShift</a:t>
+            </a:r>
+            <a:r>
+              <a:rPr lang="ru-RU" sz="1400" dirty="0">
+                <a:latin typeface="SB Sans Text Light" panose="020B0303040504020204" pitchFamily="34" charset="0"/>
+                <a:cs typeface="SB Sans Text Light" panose="020B0303040504020204" pitchFamily="34" charset="0"/>
+              </a:rPr>
+              <a:t>.</a:t>
+            </a:r>
+            <a:br>
+              <a:rPr lang="en-US" sz="1400" dirty="0">
+                <a:latin typeface="SB Sans Text Light" panose="020B0303040504020204" pitchFamily="34" charset="0"/>
+                <a:cs typeface="SB Sans Text Light" panose="020B0303040504020204" pitchFamily="34" charset="0"/>
+              </a:rPr>
+            </a:br>
+            <a:r>
+              <a:rPr lang="ru-RU" sz="1400" dirty="0">
+                <a:latin typeface="SB Sans Text Light" panose="020B0303040504020204" pitchFamily="34" charset="0"/>
+                <a:cs typeface="SB Sans Text Light" panose="020B0303040504020204" pitchFamily="34" charset="0"/>
+              </a:rPr>
+              <a:t>Основная деятельность: разработка (требования, архитектура, реализация, тестирование, </a:t>
+            </a:r>
+            <a:r>
+              <a:rPr lang="en-US" sz="1400" dirty="0" err="1">
+                <a:latin typeface="SB Sans Text Light" panose="020B0303040504020204" pitchFamily="34" charset="0"/>
+                <a:cs typeface="SB Sans Text Light" panose="020B0303040504020204" pitchFamily="34" charset="0"/>
+              </a:rPr>
+              <a:t>devops</a:t>
+            </a:r>
+            <a:r>
+              <a:rPr lang="ru-RU" sz="1400" dirty="0">
+                <a:latin typeface="SB Sans Text Light" panose="020B0303040504020204" pitchFamily="34" charset="0"/>
+                <a:cs typeface="SB Sans Text Light" panose="020B0303040504020204" pitchFamily="34" charset="0"/>
+              </a:rPr>
+              <a:t>), взаимодействие со смежными командами (постановка задач, консультация аналитиков</a:t>
+            </a:r>
+            <a:r>
+              <a:rPr lang="en-US" sz="1400" dirty="0">
+                <a:latin typeface="SB Sans Text Light" panose="020B0303040504020204" pitchFamily="34" charset="0"/>
+                <a:cs typeface="SB Sans Text Light" panose="020B0303040504020204" pitchFamily="34" charset="0"/>
+              </a:rPr>
               <a:t>/</a:t>
             </a:r>
             <a:r>
+              <a:rPr lang="en-US" sz="1400" dirty="0" err="1">
+                <a:latin typeface="SB Sans Text Light" panose="020B0303040504020204" pitchFamily="34" charset="0"/>
+                <a:cs typeface="SB Sans Text Light" panose="020B0303040504020204" pitchFamily="34" charset="0"/>
+              </a:rPr>
+              <a:t>п</a:t>
+            </a:r>
+            <a:r>
               <a:rPr lang="ru-RU" sz="1400" dirty="0" err="1">
                 <a:latin typeface="SB Sans Text Light" panose="020B0303040504020204" pitchFamily="34" charset="0"/>
                 <a:cs typeface="SB Sans Text Light" panose="020B0303040504020204" pitchFamily="34" charset="0"/>
               </a:rPr>
-              <a:t>j</a:t>
-            </a:r>
-            <a:r>
-              <a:rPr lang="en-US" sz="1400" dirty="0">
-                <a:latin typeface="SB Sans Text Light" panose="020B0303040504020204" pitchFamily="34" charset="0"/>
-                <a:cs typeface="SB Sans Text Light" panose="020B0303040504020204" pitchFamily="34" charset="0"/>
-              </a:rPr>
-              <a:t>ava-</a:t>
-            </a:r>
-            <a:r>
-              <a:rPr lang="ru-RU" sz="1400" dirty="0">
-                <a:latin typeface="SB Sans Text Light" panose="020B0303040504020204" pitchFamily="34" charset="0"/>
-                <a:cs typeface="SB Sans Text Light" panose="020B0303040504020204" pitchFamily="34" charset="0"/>
-              </a:rPr>
-              <a:t>разработка</a:t>
-            </a:r>
+              <a:t>оддержки</a:t>
+            </a:r>
+            <a:r>
+              <a:rPr lang="ru-RU" sz="1400" dirty="0">
+                <a:latin typeface="SB Sans Text Light" panose="020B0303040504020204" pitchFamily="34" charset="0"/>
+                <a:cs typeface="SB Sans Text Light" panose="020B0303040504020204" pitchFamily="34" charset="0"/>
+              </a:rPr>
+              <a:t>)</a:t>
+            </a:r>
+            <a:endParaRPr lang="en-US" sz="1400" dirty="0">
+              <a:latin typeface="SB Sans Text Light" panose="020B0303040504020204" pitchFamily="34" charset="0"/>
+              <a:cs typeface="SB Sans Text Light" panose="020B0303040504020204" pitchFamily="34" charset="0"/>
+            </a:endParaRPr>
           </a:p>
           <a:p>
             <a:pPr defTabSz="360000" fontAlgn="base">
@@ -3457,13 +3592,38 @@
               </a:spcAft>
               <a:defRPr/>
             </a:pPr>
+            <a:endParaRPr lang="ru-RU" sz="1400" dirty="0">
+              <a:latin typeface="SB Sans Text Light" panose="020B0303040504020204" pitchFamily="34" charset="0"/>
+              <a:cs typeface="SB Sans Text Light" panose="020B0303040504020204" pitchFamily="34" charset="0"/>
+            </a:endParaRPr>
+          </a:p>
+          <a:p>
+            <a:pPr defTabSz="360000" fontAlgn="base">
+              <a:lnSpc>
+                <a:spcPct val="100000"/>
+              </a:lnSpc>
+              <a:spcBef>
+                <a:spcPts val="0"/>
+              </a:spcBef>
+              <a:spcAft>
+                <a:spcPct val="0"/>
+              </a:spcAft>
+              <a:defRPr/>
+            </a:pPr>
+            <a:r>
+              <a:rPr lang="ru-RU" sz="1400" dirty="0">
+                <a:latin typeface="SB Sans Text Light" panose="020B0303040504020204" pitchFamily="34" charset="0"/>
+                <a:cs typeface="SB Sans Text Light" panose="020B0303040504020204" pitchFamily="34" charset="0"/>
+              </a:rPr>
+              <a:t>Город: </a:t>
+            </a:r>
             <a:endParaRPr lang="en-US" sz="1400" dirty="0">
               <a:latin typeface="SB Sans Text Light" panose="020B0303040504020204" pitchFamily="34" charset="0"/>
               <a:cs typeface="SB Sans Text Light" panose="020B0303040504020204" pitchFamily="34" charset="0"/>
             </a:endParaRPr>
           </a:p>
           <a:p>
-            <a:pPr defTabSz="360000" fontAlgn="base">
+            <a:pPr lvl="1" defTabSz="360000" fontAlgn="base">
               <a:lnSpc>
                 <a:spcPct val="100000"/>
               </a:lnSpc>
@@ -3480,32 +3640,7 @@
                 <a:latin typeface="SB Sans Text Light" panose="020B0303040504020204" pitchFamily="34" charset="0"/>
                 <a:cs typeface="SB Sans Text Light" panose="020B0303040504020204" pitchFamily="34" charset="0"/>
               </a:rPr>
-              <a:t>Город: </a:t>
-            </a:r>
-            <a:endParaRPr lang="en-US" sz="1400" dirty="0">
-              <a:latin typeface="SB Sans Text Light" panose="020B0303040504020204" pitchFamily="34" charset="0"/>
-              <a:cs typeface="SB Sans Text Light" panose="020B0303040504020204" pitchFamily="34" charset="0"/>
-            </a:endParaRPr>
-          </a:p>
-          <a:p>
-            <a:pPr lvl="1" defTabSz="360000" fontAlgn="base">
-              <a:lnSpc>
-                <a:spcPct val="100000"/>
-              </a:lnSpc>
-              <a:spcBef>
-                <a:spcPts val="0"/>
-              </a:spcBef>
-              <a:spcAft>
-                <a:spcPct val="0"/>
-              </a:spcAft>
-              <a:defRPr/>
-            </a:pPr>
-            <a:r>
-              <a:rPr lang="ru-RU" sz="1400" dirty="0">
-                <a:latin typeface="SB Sans Text Light" panose="020B0303040504020204" pitchFamily="34" charset="0"/>
-                <a:cs typeface="SB Sans Text Light" panose="020B0303040504020204" pitchFamily="34" charset="0"/>
-              </a:rPr>
-              <a:t>Барнаул</a:t>
+              <a:t>Барнаул, готов к переезду</a:t>
             </a:r>
           </a:p>
           <a:p>
@@ -3741,7 +3876,7 @@
         <p:spPr>
           <a:xfrm>
             <a:off x="685800" y="1490870"/>
-            <a:ext cx="10515600" cy="4848969"/>
+            <a:ext cx="10515600" cy="5059017"/>
           </a:xfrm>
         </p:spPr>
         <p:txBody>
@@ -4025,6 +4160,24 @@
               </a:spcAft>
               <a:defRPr/>
             </a:pPr>
+            <a:endParaRPr lang="ru-RU" sz="1400" dirty="0">
+              <a:latin typeface="SB Sans Text Light" panose="020B0303040504020204" pitchFamily="34" charset="0"/>
+              <a:cs typeface="SB Sans Text Light" panose="020B0303040504020204" pitchFamily="34" charset="0"/>
+            </a:endParaRPr>
+          </a:p>
+          <a:p>
+            <a:pPr defTabSz="360000" fontAlgn="base">
+              <a:lnSpc>
+                <a:spcPct val="150000"/>
+              </a:lnSpc>
+              <a:spcBef>
+                <a:spcPts val="0"/>
+              </a:spcBef>
+              <a:spcAft>
+                <a:spcPct val="0"/>
+              </a:spcAft>
+              <a:defRPr/>
+            </a:pPr>
             <a:r>
               <a:rPr lang="ru-RU" sz="1400" dirty="0">
                 <a:latin typeface="SB Sans Text Light" panose="020B0303040504020204" pitchFamily="34" charset="0"/>
@@ -4044,15 +4197,54 @@
                 <a:latin typeface="SB Sans Text Light" panose="020B0303040504020204" pitchFamily="34" charset="0"/>
                 <a:cs typeface="SB Sans Text Light" panose="020B0303040504020204" pitchFamily="34" charset="0"/>
               </a:rPr>
-              <a:t>: </a:t>
-            </a:r>
-            <a:r>
-              <a:rPr lang="en-GB" sz="1400" dirty="0">
+              <a:t>:</a:t>
+            </a:r>
+            <a:r>
+              <a:rPr lang="en-US" sz="1400" dirty="0">
+                <a:latin typeface="SB Sans Text Light" panose="020B0303040504020204" pitchFamily="34" charset="0"/>
+                <a:cs typeface="SB Sans Text Light" panose="020B0303040504020204" pitchFamily="34" charset="0"/>
+              </a:rPr>
+              <a:t> </a:t>
+            </a:r>
+            <a:r>
+              <a:rPr lang="en-US" sz="1400" dirty="0">
                 <a:latin typeface="SB Sans Text Light" panose="020B0303040504020204" pitchFamily="34" charset="0"/>
                 <a:cs typeface="SB Sans Text Light" panose="020B0303040504020204" pitchFamily="34" charset="0"/>
                 <a:hlinkClick r:id="rId2"/>
               </a:rPr>
-              <a:t>https://github.com/alexj-smolin/ds-school-project/tree/dev</a:t>
+              <a:t>https://</a:t>
+            </a:r>
+            <a:r>
+              <a:rPr lang="en-US" sz="1400" dirty="0" err="1">
+                <a:latin typeface="SB Sans Text Light" panose="020B0303040504020204" pitchFamily="34" charset="0"/>
+                <a:cs typeface="SB Sans Text Light" panose="020B0303040504020204" pitchFamily="34" charset="0"/>
+                <a:hlinkClick r:id="rId2"/>
+              </a:rPr>
+              <a:t>github.com</a:t>
+            </a:r>
+            <a:r>
+              <a:rPr lang="en-US" sz="1400" dirty="0">
+                <a:latin typeface="SB Sans Text Light" panose="020B0303040504020204" pitchFamily="34" charset="0"/>
+                <a:cs typeface="SB Sans Text Light" panose="020B0303040504020204" pitchFamily="34" charset="0"/>
+                <a:hlinkClick r:id="rId2"/>
+              </a:rPr>
+              <a:t>/</a:t>
+            </a:r>
+            <a:r>
+              <a:rPr lang="en-US" sz="1400" dirty="0" err="1">
+                <a:latin typeface="SB Sans Text Light" panose="020B0303040504020204" pitchFamily="34" charset="0"/>
+                <a:cs typeface="SB Sans Text Light" panose="020B0303040504020204" pitchFamily="34" charset="0"/>
+                <a:hlinkClick r:id="rId2"/>
+              </a:rPr>
+              <a:t>alexj-smolin</a:t>
+            </a:r>
+            <a:r>
+              <a:rPr lang="en-US" sz="1400" dirty="0">
+                <a:latin typeface="SB Sans Text Light" panose="020B0303040504020204" pitchFamily="34" charset="0"/>
+                <a:cs typeface="SB Sans Text Light" panose="020B0303040504020204" pitchFamily="34" charset="0"/>
+                <a:hlinkClick r:id="rId2"/>
+              </a:rPr>
+              <a:t>/ds-school-project</a:t>
             </a:r>
             <a:endParaRPr lang="ru-RU" sz="1400" dirty="0">
               <a:latin typeface="SB Sans Text Light" panose="020B0303040504020204" pitchFamily="34" charset="0"/>
@@ -4181,7 +4373,7 @@
         </p:blipFill>
         <p:spPr>
           <a:xfrm>
-            <a:off x="3525013" y="2985168"/>
+            <a:off x="3049603" y="3184300"/>
             <a:ext cx="4594461" cy="2623797"/>
           </a:xfrm>
           <a:prstGeom prst="rect">
@@ -4231,12 +4423,14 @@
         </p:nvSpPr>
         <p:spPr>
           <a:xfrm>
-            <a:off x="685800" y="1461052"/>
-            <a:ext cx="10515600" cy="4518577"/>
+            <a:off x="685799" y="1461052"/>
+            <a:ext cx="11032435" cy="4562061"/>
           </a:xfrm>
         </p:spPr>
         <p:txBody>
-          <a:bodyPr/>
+          <a:bodyPr>
+            <a:normAutofit lnSpcReduction="10000"/>
+          </a:bodyPr>
           <a:lstStyle/>
           <a:p>
             <a:pPr marL="230400" indent="-230400">
@@ -4305,6 +4499,17 @@
               </a:rPr>
               <a:t>применение сглаживания движения рамки</a:t>
             </a:r>
+            <a:r>
+              <a:rPr lang="en-US" sz="1400" dirty="0">
+                <a:latin typeface="SB Sans Text Light" panose="020B0303040504020204" pitchFamily="34" charset="0"/>
+                <a:cs typeface="SB Sans Text Light" panose="020B0303040504020204" pitchFamily="34" charset="0"/>
+              </a:rPr>
+              <a:t> (single exponential smoothing)</a:t>
+            </a:r>
+            <a:endParaRPr lang="ru-RU" sz="1400" dirty="0">
+              <a:latin typeface="SB Sans Text Light" panose="020B0303040504020204" pitchFamily="34" charset="0"/>
+              <a:cs typeface="SB Sans Text Light" panose="020B0303040504020204" pitchFamily="34" charset="0"/>
+            </a:endParaRPr>
           </a:p>
           <a:p>
             <a:pPr marL="687600" lvl="2" indent="-230400">
@@ -4337,8 +4542,192 @@
                 <a:latin typeface="SB Sans Text Light" panose="020B0303040504020204" pitchFamily="34" charset="0"/>
                 <a:cs typeface="SB Sans Text Light" panose="020B0303040504020204" pitchFamily="34" charset="0"/>
               </a:rPr>
-              <a:t>Различные расстояния рассчитываются на основе реальных размеров объекта и данных с камеры (геометрия, оптика)</a:t>
-            </a:r>
+              <a:t>Различные расстояния рассчитываются на основе реальных размеров объекта и характеристик камеры (геометрия, оптика)</a:t>
+            </a:r>
+          </a:p>
+          <a:p>
+            <a:pPr marL="0" indent="0">
+              <a:lnSpc>
+                <a:spcPct val="150000"/>
+              </a:lnSpc>
+              <a:spcBef>
+                <a:spcPts val="0"/>
+              </a:spcBef>
+              <a:buNone/>
+            </a:pPr>
+            <a:r>
+              <a:rPr lang="ru-RU" sz="1400" dirty="0">
+                <a:latin typeface="SB Sans Text Light" panose="020B0303040504020204" pitchFamily="34" charset="0"/>
+                <a:cs typeface="SB Sans Text Light" panose="020B0303040504020204" pitchFamily="34" charset="0"/>
+              </a:rPr>
+              <a:t>___</a:t>
+            </a:r>
+          </a:p>
+          <a:p>
+            <a:pPr marL="230400" indent="-230400">
+              <a:lnSpc>
+                <a:spcPct val="150000"/>
+              </a:lnSpc>
+              <a:spcBef>
+                <a:spcPts val="0"/>
+              </a:spcBef>
+            </a:pPr>
+            <a:endParaRPr lang="ru-RU" sz="1400" dirty="0">
+              <a:latin typeface="SB Sans Text Light" panose="020B0303040504020204" pitchFamily="34" charset="0"/>
+              <a:cs typeface="SB Sans Text Light" panose="020B0303040504020204" pitchFamily="34" charset="0"/>
+            </a:endParaRPr>
+          </a:p>
+          <a:p>
+            <a:pPr marL="230400" indent="-230400">
+              <a:lnSpc>
+                <a:spcPct val="150000"/>
+              </a:lnSpc>
+              <a:spcBef>
+                <a:spcPts val="0"/>
+              </a:spcBef>
+            </a:pPr>
+            <a:r>
+              <a:rPr lang="en-US" sz="1400" dirty="0">
+                <a:latin typeface="SB Sans Text Light" panose="020B0303040504020204" pitchFamily="34" charset="0"/>
+                <a:cs typeface="SB Sans Text Light" panose="020B0303040504020204" pitchFamily="34" charset="0"/>
+              </a:rPr>
+              <a:t>Real-time</a:t>
+            </a:r>
+            <a:r>
+              <a:rPr lang="ru-RU" sz="1400" dirty="0">
+                <a:latin typeface="SB Sans Text Light" panose="020B0303040504020204" pitchFamily="34" charset="0"/>
+                <a:cs typeface="SB Sans Text Light" panose="020B0303040504020204" pitchFamily="34" charset="0"/>
+              </a:rPr>
+              <a:t>: есть опция для запуска обработки видео в реальном времени. Идея:</a:t>
+            </a:r>
+          </a:p>
+          <a:p>
+            <a:pPr marL="687600" lvl="1" indent="-230400">
+              <a:lnSpc>
+                <a:spcPct val="150000"/>
+              </a:lnSpc>
+              <a:spcBef>
+                <a:spcPts val="0"/>
+              </a:spcBef>
+            </a:pPr>
+            <a:r>
+              <a:rPr lang="ru-RU" sz="1400" dirty="0">
+                <a:latin typeface="SB Sans Text Light" panose="020B0303040504020204" pitchFamily="34" charset="0"/>
+                <a:cs typeface="SB Sans Text Light" panose="020B0303040504020204" pitchFamily="34" charset="0"/>
+              </a:rPr>
+              <a:t>предполагается, что объекты двигаются плавно, и их движение можно аппроксимировать прямой линией на коротком отрезке</a:t>
+            </a:r>
+            <a:endParaRPr lang="en-US" sz="1400" dirty="0">
+              <a:latin typeface="SB Sans Text Light" panose="020B0303040504020204" pitchFamily="34" charset="0"/>
+              <a:cs typeface="SB Sans Text Light" panose="020B0303040504020204" pitchFamily="34" charset="0"/>
+            </a:endParaRPr>
+          </a:p>
+          <a:p>
+            <a:pPr marL="687600" lvl="1" indent="-230400">
+              <a:lnSpc>
+                <a:spcPct val="150000"/>
+              </a:lnSpc>
+              <a:spcBef>
+                <a:spcPts val="0"/>
+              </a:spcBef>
+            </a:pPr>
+            <a:r>
+              <a:rPr lang="ru-RU" sz="1400" dirty="0">
+                <a:latin typeface="SB Sans Text Light" panose="020B0303040504020204" pitchFamily="34" charset="0"/>
+                <a:cs typeface="SB Sans Text Light" panose="020B0303040504020204" pitchFamily="34" charset="0"/>
+              </a:rPr>
+              <a:t>детектор асинхронно (в отдельном процессе) обрабатывает некоторые кадры</a:t>
+            </a:r>
+          </a:p>
+          <a:p>
+            <a:pPr marL="687600" lvl="1" indent="-230400">
+              <a:lnSpc>
+                <a:spcPct val="150000"/>
+              </a:lnSpc>
+              <a:spcBef>
+                <a:spcPts val="0"/>
+              </a:spcBef>
+            </a:pPr>
+            <a:r>
+              <a:rPr lang="ru-RU" sz="1400" dirty="0">
+                <a:latin typeface="SB Sans Text Light" panose="020B0303040504020204" pitchFamily="34" charset="0"/>
+                <a:cs typeface="SB Sans Text Light" panose="020B0303040504020204" pitchFamily="34" charset="0"/>
+              </a:rPr>
+              <a:t>предсказание рамки происходит прямолинейно по последним детектированным точкам</a:t>
+            </a:r>
+          </a:p>
+          <a:p>
+            <a:pPr marL="687600" lvl="1" indent="-230400">
+              <a:lnSpc>
+                <a:spcPct val="150000"/>
+              </a:lnSpc>
+              <a:spcBef>
+                <a:spcPts val="0"/>
+              </a:spcBef>
+            </a:pPr>
+            <a:r>
+              <a:rPr lang="ru-RU" sz="1400" dirty="0">
+                <a:latin typeface="SB Sans Text Light" panose="020B0303040504020204" pitchFamily="34" charset="0"/>
+                <a:cs typeface="SB Sans Text Light" panose="020B0303040504020204" pitchFamily="34" charset="0"/>
+              </a:rPr>
+              <a:t>ограничение: допускается наличие только одного объекта интересующего класса</a:t>
+            </a:r>
+          </a:p>
+          <a:p>
+            <a:pPr marL="687600" lvl="1" indent="-230400">
+              <a:lnSpc>
+                <a:spcPct val="150000"/>
+              </a:lnSpc>
+              <a:spcBef>
+                <a:spcPts val="0"/>
+              </a:spcBef>
+            </a:pPr>
+            <a:r>
+              <a:rPr lang="en-GB" sz="1400" dirty="0">
+                <a:latin typeface="SB Sans Text Light" panose="020B0303040504020204" pitchFamily="34" charset="0"/>
+                <a:cs typeface="SB Sans Text Light" panose="020B0303040504020204" pitchFamily="34" charset="0"/>
+              </a:rPr>
+              <a:t>t</a:t>
+            </a:r>
+            <a:r>
+              <a:rPr lang="en-US" sz="1400" dirty="0" err="1">
+                <a:latin typeface="SB Sans Text Light" panose="020B0303040504020204" pitchFamily="34" charset="0"/>
+                <a:cs typeface="SB Sans Text Light" panose="020B0303040504020204" pitchFamily="34" charset="0"/>
+              </a:rPr>
+              <a:t>rade</a:t>
+            </a:r>
+            <a:r>
+              <a:rPr lang="ru-RU" sz="1400" dirty="0">
+                <a:latin typeface="SB Sans Text Light" panose="020B0303040504020204" pitchFamily="34" charset="0"/>
+                <a:cs typeface="SB Sans Text Light" panose="020B0303040504020204" pitchFamily="34" charset="0"/>
+              </a:rPr>
+              <a:t>-</a:t>
+            </a:r>
+            <a:r>
+              <a:rPr lang="en-US" sz="1400" dirty="0">
+                <a:latin typeface="SB Sans Text Light" panose="020B0303040504020204" pitchFamily="34" charset="0"/>
+                <a:cs typeface="SB Sans Text Light" panose="020B0303040504020204" pitchFamily="34" charset="0"/>
+              </a:rPr>
+              <a:t>off:</a:t>
+            </a:r>
+            <a:r>
+              <a:rPr lang="ru-RU" sz="1400" dirty="0">
+                <a:latin typeface="SB Sans Text Light" panose="020B0303040504020204" pitchFamily="34" charset="0"/>
+                <a:cs typeface="SB Sans Text Light" panose="020B0303040504020204" pitchFamily="34" charset="0"/>
+              </a:rPr>
+              <a:t>  теряем в качестве, но получаем картинку в реальном времени и компенсируем ошибки </a:t>
+            </a:r>
+            <a:r>
+              <a:rPr lang="ru-RU" sz="1400" dirty="0" err="1">
+                <a:latin typeface="SB Sans Text Light" panose="020B0303040504020204" pitchFamily="34" charset="0"/>
+                <a:cs typeface="SB Sans Text Light" panose="020B0303040504020204" pitchFamily="34" charset="0"/>
+              </a:rPr>
+              <a:t>детекции</a:t>
+            </a:r>
+            <a:endParaRPr lang="ru-RU" sz="1400" dirty="0">
+              <a:latin typeface="SB Sans Text Light" panose="020B0303040504020204" pitchFamily="34" charset="0"/>
+              <a:cs typeface="SB Sans Text Light" panose="020B0303040504020204" pitchFamily="34" charset="0"/>
+            </a:endParaRPr>
           </a:p>
           <a:p>
             <a:pPr marL="230400" indent="-230400">
@@ -4783,7 +5172,7 @@
                 <a:latin typeface="SB Sans Text Light" panose="020B0303040504020204" pitchFamily="34" charset="0"/>
                 <a:cs typeface="SB Sans Text Light" panose="020B0303040504020204" pitchFamily="34" charset="0"/>
               </a:rPr>
-              <a:t>характеристики камеры (фокусное расстояние, ширина и высота матрицы)</a:t>
+              <a:t>характеристики камеры (фокусное расстояние (константное), ширина и высота матрицы)</a:t>
             </a:r>
           </a:p>
           <a:p>
@@ -4817,7 +5206,7 @@
                 <a:latin typeface="SB Sans Text Light" panose="020B0303040504020204" pitchFamily="34" charset="0"/>
                 <a:cs typeface="SB Sans Text Light" panose="020B0303040504020204" pitchFamily="34" charset="0"/>
               </a:rPr>
-              <a:t>параметры постобработки</a:t>
+              <a:t>параметры постобработки (сглаживание, допустимые отклонения размеров объекта, асинхронный режим)</a:t>
             </a:r>
           </a:p>
           <a:p>
@@ -4919,276 +5308,6 @@
       </p:grpSpPr>
       <p:sp>
         <p:nvSpPr>
-          <p:cNvPr id="3" name="Объект 2"/>
-          <p:cNvSpPr>
-            <a:spLocks noGrp="1"/>
-          </p:cNvSpPr>
-          <p:nvPr>
-            <p:ph idx="4294967295"/>
-          </p:nvPr>
-        </p:nvSpPr>
-        <p:spPr>
-          <a:xfrm>
-            <a:off x="636104" y="1497634"/>
-            <a:ext cx="7076661" cy="2994852"/>
-          </a:xfrm>
-        </p:spPr>
-        <p:txBody>
-          <a:bodyPr>
-            <a:normAutofit/>
-          </a:bodyPr>
-          <a:lstStyle/>
-          <a:p>
-            <a:pPr>
-              <a:lnSpc>
-                <a:spcPct val="150000"/>
-              </a:lnSpc>
-              <a:spcBef>
-                <a:spcPts val="0"/>
-              </a:spcBef>
-            </a:pPr>
-            <a:r>
-              <a:rPr lang="ru-RU" sz="1400" dirty="0">
-                <a:latin typeface="SB Sans Text Light" panose="020B0303040504020204" pitchFamily="34" charset="0"/>
-                <a:cs typeface="SB Sans Text Light" panose="020B0303040504020204" pitchFamily="34" charset="0"/>
-              </a:rPr>
-              <a:t>Детектор: семейство моделей </a:t>
-            </a:r>
-            <a:r>
-              <a:rPr lang="en-US" sz="1400" dirty="0">
-                <a:latin typeface="SB Sans Text Light" panose="020B0303040504020204" pitchFamily="34" charset="0"/>
-                <a:cs typeface="SB Sans Text Light" panose="020B0303040504020204" pitchFamily="34" charset="0"/>
-              </a:rPr>
-              <a:t>YOLO (</a:t>
-            </a:r>
-            <a:r>
-              <a:rPr lang="ru-RU" sz="1400" dirty="0">
-                <a:latin typeface="SB Sans Text Light" panose="020B0303040504020204" pitchFamily="34" charset="0"/>
-                <a:cs typeface="SB Sans Text Light" panose="020B0303040504020204" pitchFamily="34" charset="0"/>
-              </a:rPr>
-              <a:t>в проекте использовалась модель </a:t>
-            </a:r>
-            <a:r>
-              <a:rPr lang="en-US" sz="1400" dirty="0">
-                <a:latin typeface="SB Sans Text Light" panose="020B0303040504020204" pitchFamily="34" charset="0"/>
-                <a:cs typeface="SB Sans Text Light" panose="020B0303040504020204" pitchFamily="34" charset="0"/>
-              </a:rPr>
-              <a:t>`yolo</a:t>
-            </a:r>
-            <a:r>
-              <a:rPr lang="ru-RU" sz="1400" dirty="0">
-                <a:latin typeface="SB Sans Text Light" panose="020B0303040504020204" pitchFamily="34" charset="0"/>
-                <a:cs typeface="SB Sans Text Light" panose="020B0303040504020204" pitchFamily="34" charset="0"/>
-              </a:rPr>
-              <a:t>-</a:t>
-            </a:r>
-            <a:r>
-              <a:rPr lang="en-US" sz="1400" dirty="0">
-                <a:latin typeface="SB Sans Text Light" panose="020B0303040504020204" pitchFamily="34" charset="0"/>
-                <a:cs typeface="SB Sans Text Light" panose="020B0303040504020204" pitchFamily="34" charset="0"/>
-              </a:rPr>
-              <a:t>v8</a:t>
-            </a:r>
-            <a:r>
-              <a:rPr lang="ru-RU" sz="1400" dirty="0">
-                <a:latin typeface="SB Sans Text Light" panose="020B0303040504020204" pitchFamily="34" charset="0"/>
-                <a:cs typeface="SB Sans Text Light" panose="020B0303040504020204" pitchFamily="34" charset="0"/>
-              </a:rPr>
-              <a:t>-</a:t>
-            </a:r>
-            <a:r>
-              <a:rPr lang="en-US" sz="1400" dirty="0">
-                <a:latin typeface="SB Sans Text Light" panose="020B0303040504020204" pitchFamily="34" charset="0"/>
-                <a:cs typeface="SB Sans Text Light" panose="020B0303040504020204" pitchFamily="34" charset="0"/>
-              </a:rPr>
-              <a:t>nano`)</a:t>
-            </a:r>
-          </a:p>
-          <a:p>
-            <a:pPr>
-              <a:lnSpc>
-                <a:spcPct val="150000"/>
-              </a:lnSpc>
-              <a:spcBef>
-                <a:spcPts val="0"/>
-              </a:spcBef>
-            </a:pPr>
-            <a:r>
-              <a:rPr lang="ru-RU" sz="1400" dirty="0">
-                <a:latin typeface="SB Sans Text Light" panose="020B0303040504020204" pitchFamily="34" charset="0"/>
-                <a:cs typeface="SB Sans Text Light" panose="020B0303040504020204" pitchFamily="34" charset="0"/>
-              </a:rPr>
-              <a:t>Библиотеки для работы с видео: </a:t>
-            </a:r>
-            <a:r>
-              <a:rPr lang="en-US" sz="1400" dirty="0">
-                <a:latin typeface="SB Sans Text Light" panose="020B0303040504020204" pitchFamily="34" charset="0"/>
-                <a:cs typeface="SB Sans Text Light" panose="020B0303040504020204" pitchFamily="34" charset="0"/>
-              </a:rPr>
-              <a:t>OpenCV, </a:t>
-            </a:r>
-            <a:r>
-              <a:rPr lang="en-US" sz="1400" dirty="0" err="1">
-                <a:latin typeface="SB Sans Text Light" panose="020B0303040504020204" pitchFamily="34" charset="0"/>
-                <a:cs typeface="SB Sans Text Light" panose="020B0303040504020204" pitchFamily="34" charset="0"/>
-              </a:rPr>
-              <a:t>Torchvision</a:t>
-            </a:r>
-            <a:r>
-              <a:rPr lang="en-US" sz="1400" dirty="0">
-                <a:latin typeface="SB Sans Text Light" panose="020B0303040504020204" pitchFamily="34" charset="0"/>
-                <a:cs typeface="SB Sans Text Light" panose="020B0303040504020204" pitchFamily="34" charset="0"/>
-              </a:rPr>
-              <a:t>, AV (</a:t>
-            </a:r>
-            <a:r>
-              <a:rPr lang="en-US" sz="1400" dirty="0" err="1">
-                <a:latin typeface="SB Sans Text Light" panose="020B0303040504020204" pitchFamily="34" charset="0"/>
-                <a:cs typeface="SB Sans Text Light" panose="020B0303040504020204" pitchFamily="34" charset="0"/>
-              </a:rPr>
-              <a:t>FFmpeg</a:t>
-            </a:r>
-            <a:r>
-              <a:rPr lang="en-US" sz="1400" dirty="0">
-                <a:latin typeface="SB Sans Text Light" panose="020B0303040504020204" pitchFamily="34" charset="0"/>
-                <a:cs typeface="SB Sans Text Light" panose="020B0303040504020204" pitchFamily="34" charset="0"/>
-              </a:rPr>
-              <a:t>)</a:t>
-            </a:r>
-          </a:p>
-          <a:p>
-            <a:pPr>
-              <a:lnSpc>
-                <a:spcPct val="150000"/>
-              </a:lnSpc>
-              <a:spcBef>
-                <a:spcPts val="0"/>
-              </a:spcBef>
-            </a:pPr>
-            <a:r>
-              <a:rPr lang="ru-RU" sz="1400" dirty="0">
-                <a:latin typeface="SB Sans Text Light" panose="020B0303040504020204" pitchFamily="34" charset="0"/>
-                <a:cs typeface="SB Sans Text Light" panose="020B0303040504020204" pitchFamily="34" charset="0"/>
-              </a:rPr>
-              <a:t>Трекинг экспериментов: </a:t>
-            </a:r>
-            <a:r>
-              <a:rPr lang="ru-RU" sz="1400" dirty="0" err="1">
-                <a:latin typeface="SB Sans Text Light" panose="020B0303040504020204" pitchFamily="34" charset="0"/>
-                <a:cs typeface="SB Sans Text Light" panose="020B0303040504020204" pitchFamily="34" charset="0"/>
-              </a:rPr>
-              <a:t>M</a:t>
-            </a:r>
-            <a:r>
-              <a:rPr lang="en-US" sz="1400" dirty="0" err="1">
-                <a:latin typeface="SB Sans Text Light" panose="020B0303040504020204" pitchFamily="34" charset="0"/>
-                <a:cs typeface="SB Sans Text Light" panose="020B0303040504020204" pitchFamily="34" charset="0"/>
-              </a:rPr>
-              <a:t>LFlow</a:t>
-            </a:r>
-            <a:r>
-              <a:rPr lang="en-US" sz="1400" dirty="0">
-                <a:latin typeface="SB Sans Text Light" panose="020B0303040504020204" pitchFamily="34" charset="0"/>
-                <a:cs typeface="SB Sans Text Light" panose="020B0303040504020204" pitchFamily="34" charset="0"/>
-              </a:rPr>
-              <a:t> + docker (</a:t>
-            </a:r>
-            <a:r>
-              <a:rPr lang="en-US" sz="1400" dirty="0" err="1">
-                <a:latin typeface="SB Sans Text Light" panose="020B0303040504020204" pitchFamily="34" charset="0"/>
-                <a:cs typeface="SB Sans Text Light" panose="020B0303040504020204" pitchFamily="34" charset="0"/>
-              </a:rPr>
-              <a:t>mlflow</a:t>
-            </a:r>
-            <a:r>
-              <a:rPr lang="en-US" sz="1400" dirty="0">
-                <a:latin typeface="SB Sans Text Light" panose="020B0303040504020204" pitchFamily="34" charset="0"/>
-                <a:cs typeface="SB Sans Text Light" panose="020B0303040504020204" pitchFamily="34" charset="0"/>
-              </a:rPr>
-              <a:t> server, </a:t>
-            </a:r>
-            <a:r>
-              <a:rPr lang="en-US" sz="1400" dirty="0" err="1">
-                <a:latin typeface="SB Sans Text Light" panose="020B0303040504020204" pitchFamily="34" charset="0"/>
-                <a:cs typeface="SB Sans Text Light" panose="020B0303040504020204" pitchFamily="34" charset="0"/>
-              </a:rPr>
-              <a:t>postgres</a:t>
-            </a:r>
-            <a:r>
-              <a:rPr lang="en-US" sz="1400" dirty="0">
-                <a:latin typeface="SB Sans Text Light" panose="020B0303040504020204" pitchFamily="34" charset="0"/>
-                <a:cs typeface="SB Sans Text Light" panose="020B0303040504020204" pitchFamily="34" charset="0"/>
-              </a:rPr>
-              <a:t>, s3 storage)</a:t>
-            </a:r>
-          </a:p>
-          <a:p>
-            <a:pPr>
-              <a:lnSpc>
-                <a:spcPct val="150000"/>
-              </a:lnSpc>
-              <a:spcBef>
-                <a:spcPts val="0"/>
-              </a:spcBef>
-            </a:pPr>
-            <a:r>
-              <a:rPr lang="ru-RU" sz="1400" dirty="0">
-                <a:latin typeface="SB Sans Text Light" panose="020B0303040504020204" pitchFamily="34" charset="0"/>
-                <a:cs typeface="SB Sans Text Light" panose="020B0303040504020204" pitchFamily="34" charset="0"/>
-              </a:rPr>
-              <a:t>Конфигурация запуска</a:t>
-            </a:r>
-            <a:r>
-              <a:rPr lang="en-US" sz="1400" dirty="0">
-                <a:latin typeface="SB Sans Text Light" panose="020B0303040504020204" pitchFamily="34" charset="0"/>
-                <a:cs typeface="SB Sans Text Light" panose="020B0303040504020204" pitchFamily="34" charset="0"/>
-              </a:rPr>
-              <a:t> </a:t>
-            </a:r>
-            <a:r>
-              <a:rPr lang="ru-RU" sz="1400" dirty="0">
-                <a:latin typeface="SB Sans Text Light" panose="020B0303040504020204" pitchFamily="34" charset="0"/>
-                <a:cs typeface="SB Sans Text Light" panose="020B0303040504020204" pitchFamily="34" charset="0"/>
-              </a:rPr>
-              <a:t>проекта: </a:t>
-            </a:r>
-            <a:r>
-              <a:rPr lang="ru-RU" sz="1400" dirty="0" err="1">
-                <a:latin typeface="SB Sans Text Light" panose="020B0303040504020204" pitchFamily="34" charset="0"/>
-                <a:cs typeface="SB Sans Text Light" panose="020B0303040504020204" pitchFamily="34" charset="0"/>
-              </a:rPr>
-              <a:t>d</a:t>
-            </a:r>
-            <a:r>
-              <a:rPr lang="en-US" sz="1400" dirty="0" err="1">
-                <a:latin typeface="SB Sans Text Light" panose="020B0303040504020204" pitchFamily="34" charset="0"/>
-                <a:cs typeface="SB Sans Text Light" panose="020B0303040504020204" pitchFamily="34" charset="0"/>
-              </a:rPr>
-              <a:t>otenv</a:t>
-            </a:r>
-            <a:endParaRPr lang="en-US" sz="1400" dirty="0">
-              <a:latin typeface="SB Sans Text Light" panose="020B0303040504020204" pitchFamily="34" charset="0"/>
-              <a:cs typeface="SB Sans Text Light" panose="020B0303040504020204" pitchFamily="34" charset="0"/>
-            </a:endParaRPr>
-          </a:p>
-          <a:p>
-            <a:pPr>
-              <a:lnSpc>
-                <a:spcPct val="150000"/>
-              </a:lnSpc>
-              <a:spcBef>
-                <a:spcPts val="0"/>
-              </a:spcBef>
-            </a:pPr>
-            <a:endParaRPr lang="ru-RU" sz="1400" dirty="0">
-              <a:latin typeface="SB Sans Text Light" panose="020B0303040504020204" pitchFamily="34" charset="0"/>
-              <a:cs typeface="SB Sans Text Light" panose="020B0303040504020204" pitchFamily="34" charset="0"/>
-            </a:endParaRPr>
-          </a:p>
-        </p:txBody>
-      </p:sp>
-      <p:sp>
-        <p:nvSpPr>
           <p:cNvPr id="4" name="Title 7">
             <a:extLst>
               <a:ext uri="{FF2B5EF4-FFF2-40B4-BE49-F238E27FC236}">
@@ -5287,6 +5406,335 @@
           </a:prstGeom>
         </p:spPr>
       </p:pic>
+      <p:sp>
+        <p:nvSpPr>
+          <p:cNvPr id="3" name="Объект 2"/>
+          <p:cNvSpPr>
+            <a:spLocks noGrp="1"/>
+          </p:cNvSpPr>
+          <p:nvPr>
+            <p:ph idx="4294967295"/>
+          </p:nvPr>
+        </p:nvSpPr>
+        <p:spPr>
+          <a:xfrm>
+            <a:off x="636104" y="1497634"/>
+            <a:ext cx="7285383" cy="2994852"/>
+          </a:xfrm>
+        </p:spPr>
+        <p:txBody>
+          <a:bodyPr>
+            <a:normAutofit/>
+          </a:bodyPr>
+          <a:lstStyle/>
+          <a:p>
+            <a:pPr>
+              <a:lnSpc>
+                <a:spcPct val="150000"/>
+              </a:lnSpc>
+              <a:spcBef>
+                <a:spcPts val="0"/>
+              </a:spcBef>
+            </a:pPr>
+            <a:r>
+              <a:rPr lang="ru-RU" sz="1400" dirty="0">
+                <a:latin typeface="SB Sans Text Light" panose="020B0303040504020204" pitchFamily="34" charset="0"/>
+                <a:cs typeface="SB Sans Text Light" panose="020B0303040504020204" pitchFamily="34" charset="0"/>
+              </a:rPr>
+              <a:t>Язык: </a:t>
+            </a:r>
+            <a:r>
+              <a:rPr lang="en-US" sz="1400" dirty="0">
+                <a:latin typeface="SB Sans Text Light" panose="020B0303040504020204" pitchFamily="34" charset="0"/>
+                <a:cs typeface="SB Sans Text Light" panose="020B0303040504020204" pitchFamily="34" charset="0"/>
+              </a:rPr>
+              <a:t>python</a:t>
+            </a:r>
+            <a:endParaRPr lang="ru-RU" sz="1400" dirty="0">
+              <a:latin typeface="SB Sans Text Light" panose="020B0303040504020204" pitchFamily="34" charset="0"/>
+              <a:cs typeface="SB Sans Text Light" panose="020B0303040504020204" pitchFamily="34" charset="0"/>
+            </a:endParaRPr>
+          </a:p>
+          <a:p>
+            <a:pPr>
+              <a:lnSpc>
+                <a:spcPct val="150000"/>
+              </a:lnSpc>
+              <a:spcBef>
+                <a:spcPts val="0"/>
+              </a:spcBef>
+            </a:pPr>
+            <a:r>
+              <a:rPr lang="ru-RU" sz="1400" dirty="0">
+                <a:latin typeface="SB Sans Text Light" panose="020B0303040504020204" pitchFamily="34" charset="0"/>
+                <a:cs typeface="SB Sans Text Light" panose="020B0303040504020204" pitchFamily="34" charset="0"/>
+              </a:rPr>
+              <a:t>Детектор: семейство моделей </a:t>
+            </a:r>
+            <a:r>
+              <a:rPr lang="en-US" sz="1400" dirty="0">
+                <a:latin typeface="SB Sans Text Light" panose="020B0303040504020204" pitchFamily="34" charset="0"/>
+                <a:cs typeface="SB Sans Text Light" panose="020B0303040504020204" pitchFamily="34" charset="0"/>
+              </a:rPr>
+              <a:t>YOLO (</a:t>
+            </a:r>
+            <a:r>
+              <a:rPr lang="ru-RU" sz="1400" dirty="0">
+                <a:latin typeface="SB Sans Text Light" panose="020B0303040504020204" pitchFamily="34" charset="0"/>
+                <a:cs typeface="SB Sans Text Light" panose="020B0303040504020204" pitchFamily="34" charset="0"/>
+              </a:rPr>
+              <a:t>использовалась модель </a:t>
+            </a:r>
+            <a:r>
+              <a:rPr lang="en-US" sz="1400" dirty="0">
+                <a:latin typeface="SB Sans Text Light" panose="020B0303040504020204" pitchFamily="34" charset="0"/>
+                <a:cs typeface="SB Sans Text Light" panose="020B0303040504020204" pitchFamily="34" charset="0"/>
+              </a:rPr>
+              <a:t>`yolo</a:t>
+            </a:r>
+            <a:r>
+              <a:rPr lang="ru-RU" sz="1400" dirty="0">
+                <a:latin typeface="SB Sans Text Light" panose="020B0303040504020204" pitchFamily="34" charset="0"/>
+                <a:cs typeface="SB Sans Text Light" panose="020B0303040504020204" pitchFamily="34" charset="0"/>
+              </a:rPr>
+              <a:t>-</a:t>
+            </a:r>
+            <a:r>
+              <a:rPr lang="en-US" sz="1400" dirty="0">
+                <a:latin typeface="SB Sans Text Light" panose="020B0303040504020204" pitchFamily="34" charset="0"/>
+                <a:cs typeface="SB Sans Text Light" panose="020B0303040504020204" pitchFamily="34" charset="0"/>
+              </a:rPr>
+              <a:t>v8</a:t>
+            </a:r>
+            <a:r>
+              <a:rPr lang="ru-RU" sz="1400" dirty="0">
+                <a:latin typeface="SB Sans Text Light" panose="020B0303040504020204" pitchFamily="34" charset="0"/>
+                <a:cs typeface="SB Sans Text Light" panose="020B0303040504020204" pitchFamily="34" charset="0"/>
+              </a:rPr>
+              <a:t>-</a:t>
+            </a:r>
+            <a:r>
+              <a:rPr lang="en-US" sz="1400" dirty="0">
+                <a:latin typeface="SB Sans Text Light" panose="020B0303040504020204" pitchFamily="34" charset="0"/>
+                <a:cs typeface="SB Sans Text Light" panose="020B0303040504020204" pitchFamily="34" charset="0"/>
+              </a:rPr>
+              <a:t>nano`)</a:t>
+            </a:r>
+            <a:br>
+              <a:rPr lang="en-US" sz="1400" dirty="0">
+                <a:latin typeface="SB Sans Text Light" panose="020B0303040504020204" pitchFamily="34" charset="0"/>
+                <a:cs typeface="SB Sans Text Light" panose="020B0303040504020204" pitchFamily="34" charset="0"/>
+              </a:rPr>
+            </a:br>
+            <a:r>
+              <a:rPr lang="ru-RU" sz="1400" dirty="0">
+                <a:latin typeface="SB Sans Text Light" panose="020B0303040504020204" pitchFamily="34" charset="0"/>
+                <a:cs typeface="SB Sans Text Light" panose="020B0303040504020204" pitchFamily="34" charset="0"/>
+              </a:rPr>
+              <a:t>(через библиотеку </a:t>
+            </a:r>
+            <a:r>
+              <a:rPr lang="en-US" sz="1400" dirty="0" err="1">
+                <a:latin typeface="SB Sans Text Light" panose="020B0303040504020204" pitchFamily="34" charset="0"/>
+                <a:cs typeface="SB Sans Text Light" panose="020B0303040504020204" pitchFamily="34" charset="0"/>
+              </a:rPr>
+              <a:t>ultralytics</a:t>
+            </a:r>
+            <a:r>
+              <a:rPr lang="ru-RU" sz="1400" dirty="0">
+                <a:latin typeface="SB Sans Text Light" panose="020B0303040504020204" pitchFamily="34" charset="0"/>
+                <a:cs typeface="SB Sans Text Light" panose="020B0303040504020204" pitchFamily="34" charset="0"/>
+              </a:rPr>
+              <a:t>)</a:t>
+            </a:r>
+            <a:endParaRPr lang="en-US" sz="1400" dirty="0">
+              <a:latin typeface="SB Sans Text Light" panose="020B0303040504020204" pitchFamily="34" charset="0"/>
+              <a:cs typeface="SB Sans Text Light" panose="020B0303040504020204" pitchFamily="34" charset="0"/>
+            </a:endParaRPr>
+          </a:p>
+          <a:p>
+            <a:pPr>
+              <a:lnSpc>
+                <a:spcPct val="150000"/>
+              </a:lnSpc>
+              <a:spcBef>
+                <a:spcPts val="0"/>
+              </a:spcBef>
+            </a:pPr>
+            <a:r>
+              <a:rPr lang="ru-RU" sz="1400" dirty="0">
+                <a:latin typeface="SB Sans Text Light" panose="020B0303040504020204" pitchFamily="34" charset="0"/>
+                <a:cs typeface="SB Sans Text Light" panose="020B0303040504020204" pitchFamily="34" charset="0"/>
+              </a:rPr>
+              <a:t>Библиотеки для работы с видео: </a:t>
+            </a:r>
+            <a:r>
+              <a:rPr lang="en-US" sz="1400" dirty="0">
+                <a:latin typeface="SB Sans Text Light" panose="020B0303040504020204" pitchFamily="34" charset="0"/>
+                <a:cs typeface="SB Sans Text Light" panose="020B0303040504020204" pitchFamily="34" charset="0"/>
+              </a:rPr>
+              <a:t>OpenCV, </a:t>
+            </a:r>
+            <a:r>
+              <a:rPr lang="en-US" sz="1400" dirty="0" err="1">
+                <a:latin typeface="SB Sans Text Light" panose="020B0303040504020204" pitchFamily="34" charset="0"/>
+                <a:cs typeface="SB Sans Text Light" panose="020B0303040504020204" pitchFamily="34" charset="0"/>
+              </a:rPr>
+              <a:t>Torchvision</a:t>
+            </a:r>
+            <a:r>
+              <a:rPr lang="en-US" sz="1400" dirty="0">
+                <a:latin typeface="SB Sans Text Light" panose="020B0303040504020204" pitchFamily="34" charset="0"/>
+                <a:cs typeface="SB Sans Text Light" panose="020B0303040504020204" pitchFamily="34" charset="0"/>
+              </a:rPr>
+              <a:t>, AV (</a:t>
+            </a:r>
+            <a:r>
+              <a:rPr lang="en-US" sz="1400" dirty="0" err="1">
+                <a:latin typeface="SB Sans Text Light" panose="020B0303040504020204" pitchFamily="34" charset="0"/>
+                <a:cs typeface="SB Sans Text Light" panose="020B0303040504020204" pitchFamily="34" charset="0"/>
+              </a:rPr>
+              <a:t>FFmpeg</a:t>
+            </a:r>
+            <a:r>
+              <a:rPr lang="en-US" sz="1400" dirty="0">
+                <a:latin typeface="SB Sans Text Light" panose="020B0303040504020204" pitchFamily="34" charset="0"/>
+                <a:cs typeface="SB Sans Text Light" panose="020B0303040504020204" pitchFamily="34" charset="0"/>
+              </a:rPr>
+              <a:t>)</a:t>
+            </a:r>
+          </a:p>
+          <a:p>
+            <a:pPr>
+              <a:lnSpc>
+                <a:spcPct val="150000"/>
+              </a:lnSpc>
+              <a:spcBef>
+                <a:spcPts val="0"/>
+              </a:spcBef>
+            </a:pPr>
+            <a:r>
+              <a:rPr lang="ru-RU" sz="1400" dirty="0">
+                <a:latin typeface="SB Sans Text Light" panose="020B0303040504020204" pitchFamily="34" charset="0"/>
+                <a:cs typeface="SB Sans Text Light" panose="020B0303040504020204" pitchFamily="34" charset="0"/>
+              </a:rPr>
+              <a:t>Трекинг экспериментов: </a:t>
+            </a:r>
+            <a:r>
+              <a:rPr lang="ru-RU" sz="1400" dirty="0" err="1">
+                <a:latin typeface="SB Sans Text Light" panose="020B0303040504020204" pitchFamily="34" charset="0"/>
+                <a:cs typeface="SB Sans Text Light" panose="020B0303040504020204" pitchFamily="34" charset="0"/>
+              </a:rPr>
+              <a:t>M</a:t>
+            </a:r>
+            <a:r>
+              <a:rPr lang="en-US" sz="1400" dirty="0" err="1">
+                <a:latin typeface="SB Sans Text Light" panose="020B0303040504020204" pitchFamily="34" charset="0"/>
+                <a:cs typeface="SB Sans Text Light" panose="020B0303040504020204" pitchFamily="34" charset="0"/>
+              </a:rPr>
+              <a:t>LFlow</a:t>
+            </a:r>
+            <a:r>
+              <a:rPr lang="en-US" sz="1400" dirty="0">
+                <a:latin typeface="SB Sans Text Light" panose="020B0303040504020204" pitchFamily="34" charset="0"/>
+                <a:cs typeface="SB Sans Text Light" panose="020B0303040504020204" pitchFamily="34" charset="0"/>
+              </a:rPr>
+              <a:t> + docker (</a:t>
+            </a:r>
+            <a:r>
+              <a:rPr lang="en-US" sz="1400" dirty="0" err="1">
+                <a:latin typeface="SB Sans Text Light" panose="020B0303040504020204" pitchFamily="34" charset="0"/>
+                <a:cs typeface="SB Sans Text Light" panose="020B0303040504020204" pitchFamily="34" charset="0"/>
+              </a:rPr>
+              <a:t>mlflow</a:t>
+            </a:r>
+            <a:r>
+              <a:rPr lang="en-US" sz="1400" dirty="0">
+                <a:latin typeface="SB Sans Text Light" panose="020B0303040504020204" pitchFamily="34" charset="0"/>
+                <a:cs typeface="SB Sans Text Light" panose="020B0303040504020204" pitchFamily="34" charset="0"/>
+              </a:rPr>
+              <a:t> server, </a:t>
+            </a:r>
+            <a:r>
+              <a:rPr lang="en-US" sz="1400" dirty="0" err="1">
+                <a:latin typeface="SB Sans Text Light" panose="020B0303040504020204" pitchFamily="34" charset="0"/>
+                <a:cs typeface="SB Sans Text Light" panose="020B0303040504020204" pitchFamily="34" charset="0"/>
+              </a:rPr>
+              <a:t>postgres</a:t>
+            </a:r>
+            <a:r>
+              <a:rPr lang="en-US" sz="1400" dirty="0">
+                <a:latin typeface="SB Sans Text Light" panose="020B0303040504020204" pitchFamily="34" charset="0"/>
+                <a:cs typeface="SB Sans Text Light" panose="020B0303040504020204" pitchFamily="34" charset="0"/>
+              </a:rPr>
+              <a:t>, s3 storage)</a:t>
+            </a:r>
+          </a:p>
+          <a:p>
+            <a:pPr>
+              <a:lnSpc>
+                <a:spcPct val="150000"/>
+              </a:lnSpc>
+              <a:spcBef>
+                <a:spcPts val="0"/>
+              </a:spcBef>
+            </a:pPr>
+            <a:r>
+              <a:rPr lang="ru-RU" sz="1400" dirty="0">
+                <a:latin typeface="SB Sans Text Light" panose="020B0303040504020204" pitchFamily="34" charset="0"/>
+                <a:cs typeface="SB Sans Text Light" panose="020B0303040504020204" pitchFamily="34" charset="0"/>
+              </a:rPr>
+              <a:t>Конфигурация запуска</a:t>
+            </a:r>
+            <a:r>
+              <a:rPr lang="en-US" sz="1400" dirty="0">
+                <a:latin typeface="SB Sans Text Light" panose="020B0303040504020204" pitchFamily="34" charset="0"/>
+                <a:cs typeface="SB Sans Text Light" panose="020B0303040504020204" pitchFamily="34" charset="0"/>
+              </a:rPr>
+              <a:t> </a:t>
+            </a:r>
+            <a:r>
+              <a:rPr lang="ru-RU" sz="1400" dirty="0">
+                <a:latin typeface="SB Sans Text Light" panose="020B0303040504020204" pitchFamily="34" charset="0"/>
+                <a:cs typeface="SB Sans Text Light" panose="020B0303040504020204" pitchFamily="34" charset="0"/>
+              </a:rPr>
+              <a:t>проекта: </a:t>
+            </a:r>
+            <a:r>
+              <a:rPr lang="ru-RU" sz="1400" dirty="0" err="1">
+                <a:latin typeface="SB Sans Text Light" panose="020B0303040504020204" pitchFamily="34" charset="0"/>
+                <a:cs typeface="SB Sans Text Light" panose="020B0303040504020204" pitchFamily="34" charset="0"/>
+              </a:rPr>
+              <a:t>d</a:t>
+            </a:r>
+            <a:r>
+              <a:rPr lang="en-US" sz="1400" dirty="0" err="1">
+                <a:latin typeface="SB Sans Text Light" panose="020B0303040504020204" pitchFamily="34" charset="0"/>
+                <a:cs typeface="SB Sans Text Light" panose="020B0303040504020204" pitchFamily="34" charset="0"/>
+              </a:rPr>
+              <a:t>otenv</a:t>
+            </a:r>
+            <a:endParaRPr lang="en-US" sz="1400" dirty="0">
+              <a:latin typeface="SB Sans Text Light" panose="020B0303040504020204" pitchFamily="34" charset="0"/>
+              <a:cs typeface="SB Sans Text Light" panose="020B0303040504020204" pitchFamily="34" charset="0"/>
+            </a:endParaRPr>
+          </a:p>
+          <a:p>
+            <a:pPr>
+              <a:lnSpc>
+                <a:spcPct val="150000"/>
+              </a:lnSpc>
+              <a:spcBef>
+                <a:spcPts val="0"/>
+              </a:spcBef>
+            </a:pPr>
+            <a:endParaRPr lang="ru-RU" sz="1400" dirty="0">
+              <a:latin typeface="SB Sans Text Light" panose="020B0303040504020204" pitchFamily="34" charset="0"/>
+              <a:cs typeface="SB Sans Text Light" panose="020B0303040504020204" pitchFamily="34" charset="0"/>
+            </a:endParaRPr>
+          </a:p>
+        </p:txBody>
+      </p:sp>
       <p:sp>
         <p:nvSpPr>
           <p:cNvPr id="5" name="TextBox 4">
@@ -5388,7 +5836,7 @@
                 <a:latin typeface="SB Sans Text Light" panose="020B0303040504020204" pitchFamily="34" charset="0"/>
                 <a:cs typeface="SB Sans Text Light" panose="020B0303040504020204" pitchFamily="34" charset="0"/>
               </a:rPr>
-              <a:t>Анализ и интерпретация метрик в ноутбуке</a:t>
+              <a:t>Анализ и интерпретация метрик</a:t>
             </a:r>
             <a:r>
               <a:rPr lang="en-US" sz="1400" dirty="0">
@@ -5410,15 +5858,7 @@
                 <a:cs typeface="SB Sans Text Light" panose="020B0303040504020204" pitchFamily="34" charset="0"/>
                 <a:hlinkClick r:id="rId2"/>
               </a:rPr>
-              <a:t>notebooks/</a:t>
-            </a:r>
-            <a:r>
-              <a:rPr lang="en-US" sz="1400" dirty="0" err="1">
-                <a:latin typeface="SB Sans Text Light" panose="020B0303040504020204" pitchFamily="34" charset="0"/>
-                <a:cs typeface="SB Sans Text Light" panose="020B0303040504020204" pitchFamily="34" charset="0"/>
-                <a:hlinkClick r:id="rId2"/>
-              </a:rPr>
-              <a:t>EDA.ipynb</a:t>
+              <a:t>notebooks/metrics.ipynb</a:t>
             </a:r>
             <a:r>
               <a:rPr lang="ru-RU" sz="1400" dirty="0">
@@ -5433,75 +5873,49 @@
             </a:endParaRPr>
           </a:p>
           <a:p>
-            <a:r>
-              <a:rPr lang="ru-RU" sz="1400" dirty="0">
-                <a:latin typeface="SB Sans Text Light" panose="020B0303040504020204" pitchFamily="34" charset="0"/>
-                <a:cs typeface="SB Sans Text Light" panose="020B0303040504020204" pitchFamily="34" charset="0"/>
-              </a:rPr>
-              <a:t>Направления развития:</a:t>
-            </a:r>
-          </a:p>
-          <a:p>
-            <a:pPr lvl="1"/>
-            <a:r>
-              <a:rPr lang="ru-RU" sz="1400" dirty="0">
-                <a:latin typeface="SB Sans Text Light" panose="020B0303040504020204" pitchFamily="34" charset="0"/>
-                <a:cs typeface="SB Sans Text Light" panose="020B0303040504020204" pitchFamily="34" charset="0"/>
-              </a:rPr>
-              <a:t>усовершенствование методов постобработки</a:t>
-            </a:r>
-            <a:r>
-              <a:rPr lang="en-US" sz="1400" dirty="0">
-                <a:latin typeface="SB Sans Text Light" panose="020B0303040504020204" pitchFamily="34" charset="0"/>
-                <a:cs typeface="SB Sans Text Light" panose="020B0303040504020204" pitchFamily="34" charset="0"/>
-              </a:rPr>
-              <a:t> (</a:t>
-            </a:r>
-            <a:r>
-              <a:rPr lang="ru-RU" sz="1400" dirty="0">
-                <a:latin typeface="SB Sans Text Light" panose="020B0303040504020204" pitchFamily="34" charset="0"/>
-                <a:cs typeface="SB Sans Text Light" panose="020B0303040504020204" pitchFamily="34" charset="0"/>
-              </a:rPr>
-              <a:t>переменный фокус, нестабильность рамки</a:t>
-            </a:r>
-            <a:r>
-              <a:rPr lang="en-US" sz="1400" dirty="0">
-                <a:latin typeface="SB Sans Text Light" panose="020B0303040504020204" pitchFamily="34" charset="0"/>
-                <a:cs typeface="SB Sans Text Light" panose="020B0303040504020204" pitchFamily="34" charset="0"/>
-              </a:rPr>
-              <a:t>)</a:t>
-            </a:r>
             <a:endParaRPr lang="ru-RU" sz="1400" dirty="0">
               <a:latin typeface="SB Sans Text Light" panose="020B0303040504020204" pitchFamily="34" charset="0"/>
               <a:cs typeface="SB Sans Text Light" panose="020B0303040504020204" pitchFamily="34" charset="0"/>
             </a:endParaRPr>
           </a:p>
           <a:p>
+            <a:endParaRPr lang="ru-RU" sz="1400" dirty="0">
+              <a:latin typeface="SB Sans Text Light" panose="020B0303040504020204" pitchFamily="34" charset="0"/>
+              <a:cs typeface="SB Sans Text Light" panose="020B0303040504020204" pitchFamily="34" charset="0"/>
+            </a:endParaRPr>
+          </a:p>
+          <a:p>
+            <a:r>
+              <a:rPr lang="ru-RU" sz="1400" dirty="0">
+                <a:latin typeface="SB Sans Text Light" panose="020B0303040504020204" pitchFamily="34" charset="0"/>
+                <a:cs typeface="SB Sans Text Light" panose="020B0303040504020204" pitchFamily="34" charset="0"/>
+              </a:rPr>
+              <a:t>Направления развития:</a:t>
+            </a:r>
+          </a:p>
+          <a:p>
             <a:pPr lvl="1"/>
             <a:r>
               <a:rPr lang="ru-RU" sz="1400" dirty="0">
                 <a:latin typeface="SB Sans Text Light" panose="020B0303040504020204" pitchFamily="34" charset="0"/>
                 <a:cs typeface="SB Sans Text Light" panose="020B0303040504020204" pitchFamily="34" charset="0"/>
               </a:rPr>
-              <a:t>предсказание положения рамки по предыдущим координатам (в случае ошибок детектора)</a:t>
+              <a:t>возможность работы с переменным фокусным расстоянием</a:t>
             </a:r>
           </a:p>
           <a:p>
             <a:pPr lvl="1"/>
             <a:r>
-              <a:rPr lang="ru-RU" sz="1400" dirty="0" err="1">
-                <a:latin typeface="SB Sans Text Light" panose="020B0303040504020204" pitchFamily="34" charset="0"/>
-                <a:cs typeface="SB Sans Text Light" panose="020B0303040504020204" pitchFamily="34" charset="0"/>
-              </a:rPr>
-              <a:t>дообучение</a:t>
-            </a:r>
-            <a:r>
-              <a:rPr lang="ru-RU" sz="1400" dirty="0">
-                <a:latin typeface="SB Sans Text Light" panose="020B0303040504020204" pitchFamily="34" charset="0"/>
-                <a:cs typeface="SB Sans Text Light" panose="020B0303040504020204" pitchFamily="34" charset="0"/>
-              </a:rPr>
-              <a:t> модели на разные проекции интересующего класса объектов</a:t>
-            </a:r>
+              <a:rPr lang="ru-RU" sz="1400" dirty="0">
+                <a:latin typeface="SB Sans Text Light" panose="020B0303040504020204" pitchFamily="34" charset="0"/>
+                <a:cs typeface="SB Sans Text Light" panose="020B0303040504020204" pitchFamily="34" charset="0"/>
+              </a:rPr>
+              <a:t>ограничить количество предсказываемых кадров для асинхронного режима</a:t>
+            </a:r>
+            <a:endParaRPr lang="en-US" sz="1400" dirty="0">
+              <a:latin typeface="SB Sans Text Light" panose="020B0303040504020204" pitchFamily="34" charset="0"/>
+              <a:cs typeface="SB Sans Text Light" panose="020B0303040504020204" pitchFamily="34" charset="0"/>
+            </a:endParaRPr>
           </a:p>
           <a:p>
             <a:pPr lvl="1"/>
@@ -5510,7 +5924,21 @@
                 <a:latin typeface="SB Sans Text Light" panose="020B0303040504020204" pitchFamily="34" charset="0"/>
                 <a:cs typeface="SB Sans Text Light" panose="020B0303040504020204" pitchFamily="34" charset="0"/>
               </a:rPr>
-              <a:t>отслеживание множества объектов: идентификация объектов с помощью предсказания положения объекта по истории</a:t>
+              <a:t>отслеживание множества объектов</a:t>
+            </a:r>
+            <a:r>
+              <a:rPr lang="en-US" sz="1400" dirty="0">
+                <a:latin typeface="SB Sans Text Light" panose="020B0303040504020204" pitchFamily="34" charset="0"/>
+                <a:cs typeface="SB Sans Text Light" panose="020B0303040504020204" pitchFamily="34" charset="0"/>
+              </a:rPr>
+              <a:t> (</a:t>
+            </a:r>
+            <a:r>
+              <a:rPr lang="ru-RU" sz="1400" dirty="0">
+                <a:latin typeface="SB Sans Text Light" panose="020B0303040504020204" pitchFamily="34" charset="0"/>
+                <a:cs typeface="SB Sans Text Light" panose="020B0303040504020204" pitchFamily="34" charset="0"/>
+              </a:rPr>
+              <a:t>идентификация объектов с помощью предсказания положения объекта)</a:t>
             </a:r>
           </a:p>
           <a:p>
@@ -5521,7 +5949,9 @@
             </a:endParaRPr>
           </a:p>
           <a:p>
-            <a:pPr lvl="1"/>
+            <a:pPr marL="457200" lvl="1" indent="0">
+              <a:buNone/>
+            </a:pPr>
             <a:endParaRPr lang="ru-RU" sz="1400" dirty="0">
               <a:latin typeface="SB Sans Text Light" panose="020B0303040504020204" pitchFamily="34" charset="0"/>
               <a:cs typeface="SB Sans Text Light" panose="020B0303040504020204" pitchFamily="34" charset="0"/>

</xml_diff>